<commit_message>
Lection 1 and projects updated
</commit_message>
<xml_diff>
--- a/lections/Проекты.pptx
+++ b/lections/Проекты.pptx
@@ -5,7 +5,7 @@
     <p:sldMasterId id="2147483648" r:id="rId1"/>
   </p:sldMasterIdLst>
   <p:notesMasterIdLst>
-    <p:notesMasterId r:id="rId22"/>
+    <p:notesMasterId r:id="rId23"/>
   </p:notesMasterIdLst>
   <p:sldIdLst>
     <p:sldId id="359" r:id="rId2"/>
@@ -24,10 +24,11 @@
     <p:sldId id="380" r:id="rId15"/>
     <p:sldId id="395" r:id="rId16"/>
     <p:sldId id="393" r:id="rId17"/>
-    <p:sldId id="383" r:id="rId18"/>
-    <p:sldId id="405" r:id="rId19"/>
-    <p:sldId id="396" r:id="rId20"/>
-    <p:sldId id="407" r:id="rId21"/>
+    <p:sldId id="408" r:id="rId18"/>
+    <p:sldId id="383" r:id="rId19"/>
+    <p:sldId id="405" r:id="rId20"/>
+    <p:sldId id="396" r:id="rId21"/>
+    <p:sldId id="407" r:id="rId22"/>
   </p:sldIdLst>
   <p:sldSz cx="9144000" cy="6858000" type="screen4x3"/>
   <p:notesSz cx="6858000" cy="9144000"/>
@@ -147,6 +148,7 @@
             <p14:sldId id="380"/>
             <p14:sldId id="395"/>
             <p14:sldId id="393"/>
+            <p14:sldId id="408"/>
             <p14:sldId id="383"/>
             <p14:sldId id="405"/>
             <p14:sldId id="396"/>
@@ -5426,7 +5428,7 @@
                   <a:schemeClr val="bg1"/>
                 </a:solidFill>
               </a:rPr>
-              <a:t>7. Ассоциативная память в сети осцилляторов</a:t>
+              <a:t>7. Сравнение схем кодирования</a:t>
             </a:r>
           </a:p>
         </p:txBody>
@@ -5476,7 +5478,7 @@
         <p:spPr>
           <a:xfrm>
             <a:off x="971600" y="908720"/>
-            <a:ext cx="7848872" cy="1092607"/>
+            <a:ext cx="7848872" cy="2169825"/>
           </a:xfrm>
           <a:prstGeom prst="rect">
             <a:avLst/>
@@ -5489,35 +5491,69 @@
           </a:bodyPr>
           <a:lstStyle/>
           <a:p>
-            <a:pPr>
+            <a:pPr marL="457200" indent="-457200">
               <a:spcBef>
                 <a:spcPts val="600"/>
               </a:spcBef>
+              <a:buAutoNum type="arabicPeriod"/>
             </a:pPr>
             <a:r>
               <a:rPr lang="ru-RU" sz="2000" dirty="0"/>
-              <a:t>Образы могут кодироваться не только отдельными нейронами, но установившимися устойчивыми колебательными режимами.</a:t>
-            </a:r>
-          </a:p>
-          <a:p>
-            <a:pPr>
+              <a:t>Выбрать задачу обучения</a:t>
+            </a:r>
+          </a:p>
+          <a:p>
+            <a:pPr marL="457200" indent="-457200">
               <a:spcBef>
                 <a:spcPts val="600"/>
               </a:spcBef>
+              <a:buAutoNum type="arabicPeriod"/>
             </a:pPr>
             <a:r>
               <a:rPr lang="ru-RU" sz="2000" dirty="0"/>
-              <a:t>Реализовать такое кодирование в сети осцилляторов</a:t>
+              <a:t>Реализовать любое не частотное кодирование</a:t>
+            </a:r>
+          </a:p>
+          <a:p>
+            <a:pPr marL="457200" indent="-457200">
+              <a:spcBef>
+                <a:spcPts val="600"/>
+              </a:spcBef>
+              <a:buAutoNum type="arabicPeriod"/>
+            </a:pPr>
+            <a:r>
+              <a:rPr lang="ru-RU" sz="2000" dirty="0"/>
+              <a:t>Обучить сеть без</a:t>
+            </a:r>
+          </a:p>
+          <a:p>
+            <a:pPr marL="457200" indent="-457200">
+              <a:spcBef>
+                <a:spcPts val="600"/>
+              </a:spcBef>
+              <a:buAutoNum type="arabicPeriod"/>
+            </a:pPr>
+            <a:r>
+              <a:rPr lang="ru-RU" sz="2000" dirty="0"/>
+              <a:t>Сравнить кодирование с частотным по критериям: качество классификации, энергоэффективность (кол-во </a:t>
+            </a:r>
+            <a:r>
+              <a:rPr lang="ru-RU" sz="2000" dirty="0" err="1"/>
+              <a:t>спайков</a:t>
+            </a:r>
+            <a:r>
+              <a:rPr lang="ru-RU" sz="2000" dirty="0"/>
+              <a:t>), время реакции, устойчивость к шуму в данных </a:t>
             </a:r>
           </a:p>
         </p:txBody>
       </p:sp>
       <p:pic>
         <p:nvPicPr>
-          <p:cNvPr id="13" name="Рисунок 12">
+          <p:cNvPr id="5" name="Рисунок 4">
             <a:extLst>
               <a:ext uri="{FF2B5EF4-FFF2-40B4-BE49-F238E27FC236}">
-                <a16:creationId xmlns:a16="http://schemas.microsoft.com/office/drawing/2014/main" id="{BB3722F7-E8A2-4AD1-8A68-C3019CE5EEE5}"/>
+                <a16:creationId xmlns:a16="http://schemas.microsoft.com/office/drawing/2014/main" id="{52BD2EEB-A895-95BE-14BD-4CF34AD071A2}"/>
               </a:ext>
             </a:extLst>
           </p:cNvPr>
@@ -5534,8 +5570,8 @@
         </p:blipFill>
         <p:spPr>
           <a:xfrm>
-            <a:off x="755576" y="2127820"/>
-            <a:ext cx="3977063" cy="1941083"/>
+            <a:off x="755576" y="3270167"/>
+            <a:ext cx="3658111" cy="3038899"/>
           </a:xfrm>
           <a:prstGeom prst="rect">
             <a:avLst/>
@@ -5544,10 +5580,10 @@
       </p:pic>
       <p:pic>
         <p:nvPicPr>
-          <p:cNvPr id="14" name="Рисунок 13">
+          <p:cNvPr id="7" name="Рисунок 6">
             <a:extLst>
               <a:ext uri="{FF2B5EF4-FFF2-40B4-BE49-F238E27FC236}">
-                <a16:creationId xmlns:a16="http://schemas.microsoft.com/office/drawing/2014/main" id="{01E0E56C-C724-4570-B5E5-B3DEE8FE6126}"/>
+                <a16:creationId xmlns:a16="http://schemas.microsoft.com/office/drawing/2014/main" id="{C65935B3-B7E5-8703-B312-B3ABC5FBE395}"/>
               </a:ext>
             </a:extLst>
           </p:cNvPr>
@@ -5564,8 +5600,8 @@
         </p:blipFill>
         <p:spPr>
           <a:xfrm>
-            <a:off x="2339752" y="4437112"/>
-            <a:ext cx="3654868" cy="1690621"/>
+            <a:off x="4757892" y="3140968"/>
+            <a:ext cx="3705742" cy="1000265"/>
           </a:xfrm>
           <a:prstGeom prst="rect">
             <a:avLst/>
@@ -5574,10 +5610,10 @@
       </p:pic>
       <p:pic>
         <p:nvPicPr>
-          <p:cNvPr id="16" name="Рисунок 15">
+          <p:cNvPr id="9" name="Рисунок 8">
             <a:extLst>
               <a:ext uri="{FF2B5EF4-FFF2-40B4-BE49-F238E27FC236}">
-                <a16:creationId xmlns:a16="http://schemas.microsoft.com/office/drawing/2014/main" id="{CA420CD5-D35D-4051-80A5-9AE353FA07CE}"/>
+                <a16:creationId xmlns:a16="http://schemas.microsoft.com/office/drawing/2014/main" id="{E61994B8-BF47-BAD5-8B53-2C84A2300C79}"/>
               </a:ext>
             </a:extLst>
           </p:cNvPr>
@@ -5594,8 +5630,8 @@
         </p:blipFill>
         <p:spPr>
           <a:xfrm>
-            <a:off x="6140524" y="2247900"/>
-            <a:ext cx="2247900" cy="2362200"/>
+            <a:off x="5004048" y="4200754"/>
+            <a:ext cx="3240360" cy="2208946"/>
           </a:xfrm>
           <a:prstGeom prst="rect">
             <a:avLst/>
@@ -5605,7 +5641,7 @@
     </p:spTree>
     <p:extLst>
       <p:ext uri="{BB962C8B-B14F-4D97-AF65-F5344CB8AC3E}">
-        <p14:creationId xmlns:p14="http://schemas.microsoft.com/office/powerpoint/2010/main" val="4289954873"/>
+        <p14:creationId xmlns:p14="http://schemas.microsoft.com/office/powerpoint/2010/main" val="1674925516"/>
       </p:ext>
     </p:extLst>
   </p:cSld>
@@ -5665,7 +5701,7 @@
                   <a:schemeClr val="bg1"/>
                 </a:solidFill>
               </a:rPr>
-              <a:t>7. Ассоциативная память в сети осцилляторов</a:t>
+              <a:t>8. Ассоциативная память в сети осцилляторов</a:t>
             </a:r>
           </a:p>
         </p:txBody>
@@ -5715,113 +5751,7 @@
         <p:spPr>
           <a:xfrm>
             <a:off x="971600" y="908720"/>
-            <a:ext cx="7848872" cy="2169825"/>
-          </a:xfrm>
-          <a:prstGeom prst="rect">
-            <a:avLst/>
-          </a:prstGeom>
-          <a:noFill/>
-        </p:spPr>
-        <p:txBody>
-          <a:bodyPr wrap="square">
-            <a:spAutoFit/>
-          </a:bodyPr>
-          <a:lstStyle/>
-          <a:p>
-            <a:pPr marL="457200" indent="-457200">
-              <a:spcBef>
-                <a:spcPts val="600"/>
-              </a:spcBef>
-              <a:buAutoNum type="arabicPeriod"/>
-            </a:pPr>
-            <a:r>
-              <a:rPr lang="ru-RU" sz="2000" dirty="0"/>
-              <a:t>Создать набор простых образов, закодированных бинарными признаками. Например, </a:t>
-            </a:r>
-            <a:r>
-              <a:rPr lang="en-US" sz="2000" dirty="0"/>
-              <a:t>0-1 </a:t>
-            </a:r>
-            <a:r>
-              <a:rPr lang="ru-RU" sz="2000" dirty="0"/>
-              <a:t>матриц (крестик, квадрат </a:t>
-            </a:r>
-            <a:r>
-              <a:rPr lang="ru-RU" sz="2000" dirty="0" err="1"/>
-              <a:t>итд</a:t>
-            </a:r>
-            <a:r>
-              <a:rPr lang="ru-RU" sz="2000" dirty="0"/>
-              <a:t>)</a:t>
-            </a:r>
-          </a:p>
-          <a:p>
-            <a:pPr marL="457200" indent="-457200">
-              <a:spcBef>
-                <a:spcPts val="600"/>
-              </a:spcBef>
-              <a:buAutoNum type="arabicPeriod"/>
-            </a:pPr>
-            <a:r>
-              <a:rPr lang="ru-RU" sz="2000" dirty="0"/>
-              <a:t>Используя одно из правил обучения, научить сеть осцилляторов распознавать образы</a:t>
-            </a:r>
-          </a:p>
-          <a:p>
-            <a:pPr marL="457200" indent="-457200">
-              <a:spcBef>
-                <a:spcPts val="600"/>
-              </a:spcBef>
-              <a:buAutoNum type="arabicPeriod"/>
-            </a:pPr>
-            <a:r>
-              <a:rPr lang="ru-RU" sz="2000" dirty="0"/>
-              <a:t>Создать сеть большего размера и повторить процедуру обучения</a:t>
-            </a:r>
-          </a:p>
-          <a:p>
-            <a:pPr marL="457200" indent="-457200">
-              <a:spcBef>
-                <a:spcPts val="600"/>
-              </a:spcBef>
-              <a:buAutoNum type="arabicPeriod"/>
-            </a:pPr>
-            <a:r>
-              <a:rPr lang="ru-RU" sz="2000" dirty="0"/>
-              <a:t>Протестировать обучение и работу сети на </a:t>
-            </a:r>
-            <a:r>
-              <a:rPr lang="ru-RU" sz="2000" dirty="0" err="1"/>
-              <a:t>датасете</a:t>
-            </a:r>
-            <a:r>
-              <a:rPr lang="ru-RU" sz="2000" dirty="0"/>
-              <a:t> </a:t>
-            </a:r>
-            <a:r>
-              <a:rPr lang="en-US" sz="2000" dirty="0"/>
-              <a:t>MNIST</a:t>
-            </a:r>
-            <a:endParaRPr lang="ru-RU" sz="2000" dirty="0"/>
-          </a:p>
-        </p:txBody>
-      </p:sp>
-      <p:sp>
-        <p:nvSpPr>
-          <p:cNvPr id="10" name="TextBox 9">
-            <a:extLst>
-              <a:ext uri="{FF2B5EF4-FFF2-40B4-BE49-F238E27FC236}">
-                <a16:creationId xmlns:a16="http://schemas.microsoft.com/office/drawing/2014/main" id="{227A28F2-17AA-45E1-83C4-72A65ABF37A5}"/>
-              </a:ext>
-            </a:extLst>
-          </p:cNvPr>
-          <p:cNvSpPr txBox="1"/>
-          <p:nvPr/>
-        </p:nvSpPr>
-        <p:spPr>
-          <a:xfrm>
-            <a:off x="1038436" y="4395008"/>
-            <a:ext cx="7715200" cy="1554272"/>
+            <a:ext cx="7848872" cy="1092607"/>
           </a:xfrm>
           <a:prstGeom prst="rect">
             <a:avLst/>
@@ -5840,36 +5770,8 @@
               </a:spcBef>
             </a:pPr>
             <a:r>
-              <a:rPr lang="en-US" dirty="0" err="1"/>
-              <a:t>Hoppensteadt</a:t>
-            </a:r>
-            <a:r>
-              <a:rPr lang="en-US" dirty="0"/>
-              <a:t>, F. C., &amp; </a:t>
-            </a:r>
-            <a:r>
-              <a:rPr lang="en-US" dirty="0" err="1"/>
-              <a:t>Izhikevich</a:t>
-            </a:r>
-            <a:r>
-              <a:rPr lang="en-US" dirty="0"/>
-              <a:t>, E. M. (2001). Synchronization of MEMS resonators and mechanical neurocomputing. </a:t>
-            </a:r>
-            <a:r>
-              <a:rPr lang="en-US" i="1" dirty="0"/>
-              <a:t>IEEE Transactions on Circuits and Systems I: Fundamental Theory and Applications</a:t>
-            </a:r>
-            <a:r>
-              <a:rPr lang="en-US" dirty="0"/>
-              <a:t>, </a:t>
-            </a:r>
-            <a:r>
-              <a:rPr lang="en-US" i="1" dirty="0"/>
-              <a:t>48</a:t>
-            </a:r>
-            <a:r>
-              <a:rPr lang="en-US" dirty="0"/>
-              <a:t>(2), 133-138.</a:t>
+              <a:rPr lang="ru-RU" sz="2000" dirty="0"/>
+              <a:t>Образы могут кодироваться не только отдельными нейронами, но установившимися устойчивыми колебательными режимами.</a:t>
             </a:r>
           </a:p>
           <a:p>
@@ -5879,44 +5781,106 @@
               </a:spcBef>
             </a:pPr>
             <a:r>
-              <a:rPr lang="en-US" dirty="0" err="1"/>
-              <a:t>Hoppensteadt</a:t>
-            </a:r>
-            <a:r>
-              <a:rPr lang="en-US" dirty="0"/>
-              <a:t>, F. C., &amp; </a:t>
-            </a:r>
-            <a:r>
-              <a:rPr lang="en-US" dirty="0" err="1"/>
-              <a:t>Izhikevich</a:t>
-            </a:r>
-            <a:r>
-              <a:rPr lang="en-US" dirty="0"/>
-              <a:t>, E. M. (1999). Oscillatory neurocomputers with dynamic connectivity. </a:t>
-            </a:r>
-            <a:r>
-              <a:rPr lang="en-US" i="1" dirty="0"/>
-              <a:t>Physical Review Letters</a:t>
-            </a:r>
-            <a:r>
-              <a:rPr lang="en-US" dirty="0"/>
-              <a:t>, </a:t>
-            </a:r>
-            <a:r>
-              <a:rPr lang="en-US" i="1" dirty="0"/>
-              <a:t>82</a:t>
-            </a:r>
-            <a:r>
-              <a:rPr lang="en-US" dirty="0"/>
-              <a:t>(14), 2983.</a:t>
-            </a:r>
-          </a:p>
-        </p:txBody>
-      </p:sp>
+              <a:rPr lang="ru-RU" sz="2000" dirty="0"/>
+              <a:t>Реализовать такое кодирование в сети осцилляторов</a:t>
+            </a:r>
+          </a:p>
+        </p:txBody>
+      </p:sp>
+      <p:pic>
+        <p:nvPicPr>
+          <p:cNvPr id="13" name="Рисунок 12">
+            <a:extLst>
+              <a:ext uri="{FF2B5EF4-FFF2-40B4-BE49-F238E27FC236}">
+                <a16:creationId xmlns:a16="http://schemas.microsoft.com/office/drawing/2014/main" id="{BB3722F7-E8A2-4AD1-8A68-C3019CE5EEE5}"/>
+              </a:ext>
+            </a:extLst>
+          </p:cNvPr>
+          <p:cNvPicPr>
+            <a:picLocks noChangeAspect="1"/>
+          </p:cNvPicPr>
+          <p:nvPr/>
+        </p:nvPicPr>
+        <p:blipFill>
+          <a:blip r:embed="rId2"/>
+          <a:stretch>
+            <a:fillRect/>
+          </a:stretch>
+        </p:blipFill>
+        <p:spPr>
+          <a:xfrm>
+            <a:off x="755576" y="2127820"/>
+            <a:ext cx="3977063" cy="1941083"/>
+          </a:xfrm>
+          <a:prstGeom prst="rect">
+            <a:avLst/>
+          </a:prstGeom>
+        </p:spPr>
+      </p:pic>
+      <p:pic>
+        <p:nvPicPr>
+          <p:cNvPr id="14" name="Рисунок 13">
+            <a:extLst>
+              <a:ext uri="{FF2B5EF4-FFF2-40B4-BE49-F238E27FC236}">
+                <a16:creationId xmlns:a16="http://schemas.microsoft.com/office/drawing/2014/main" id="{01E0E56C-C724-4570-B5E5-B3DEE8FE6126}"/>
+              </a:ext>
+            </a:extLst>
+          </p:cNvPr>
+          <p:cNvPicPr>
+            <a:picLocks noChangeAspect="1"/>
+          </p:cNvPicPr>
+          <p:nvPr/>
+        </p:nvPicPr>
+        <p:blipFill>
+          <a:blip r:embed="rId3"/>
+          <a:stretch>
+            <a:fillRect/>
+          </a:stretch>
+        </p:blipFill>
+        <p:spPr>
+          <a:xfrm>
+            <a:off x="2339752" y="4437112"/>
+            <a:ext cx="3654868" cy="1690621"/>
+          </a:xfrm>
+          <a:prstGeom prst="rect">
+            <a:avLst/>
+          </a:prstGeom>
+        </p:spPr>
+      </p:pic>
+      <p:pic>
+        <p:nvPicPr>
+          <p:cNvPr id="16" name="Рисунок 15">
+            <a:extLst>
+              <a:ext uri="{FF2B5EF4-FFF2-40B4-BE49-F238E27FC236}">
+                <a16:creationId xmlns:a16="http://schemas.microsoft.com/office/drawing/2014/main" id="{CA420CD5-D35D-4051-80A5-9AE353FA07CE}"/>
+              </a:ext>
+            </a:extLst>
+          </p:cNvPr>
+          <p:cNvPicPr>
+            <a:picLocks noChangeAspect="1"/>
+          </p:cNvPicPr>
+          <p:nvPr/>
+        </p:nvPicPr>
+        <p:blipFill>
+          <a:blip r:embed="rId4"/>
+          <a:stretch>
+            <a:fillRect/>
+          </a:stretch>
+        </p:blipFill>
+        <p:spPr>
+          <a:xfrm>
+            <a:off x="6140524" y="2247900"/>
+            <a:ext cx="2247900" cy="2362200"/>
+          </a:xfrm>
+          <a:prstGeom prst="rect">
+            <a:avLst/>
+          </a:prstGeom>
+        </p:spPr>
+      </p:pic>
     </p:spTree>
     <p:extLst>
       <p:ext uri="{BB962C8B-B14F-4D97-AF65-F5344CB8AC3E}">
-        <p14:creationId xmlns:p14="http://schemas.microsoft.com/office/powerpoint/2010/main" val="2517036279"/>
+        <p14:creationId xmlns:p14="http://schemas.microsoft.com/office/powerpoint/2010/main" val="4289954873"/>
       </p:ext>
     </p:extLst>
   </p:cSld>
@@ -5976,7 +5940,7 @@
                   <a:schemeClr val="bg1"/>
                 </a:solidFill>
               </a:rPr>
-              <a:t>8. Обучение с учителем</a:t>
+              <a:t>8. Ассоциативная память в сети осцилляторов</a:t>
             </a:r>
           </a:p>
         </p:txBody>
@@ -6016,7 +5980,7 @@
           <p:cNvPr id="12" name="TextBox 11">
             <a:extLst>
               <a:ext uri="{FF2B5EF4-FFF2-40B4-BE49-F238E27FC236}">
-                <a16:creationId xmlns:a16="http://schemas.microsoft.com/office/drawing/2014/main" id="{0F9326FC-C20F-4EF4-AA05-08807FE86F6D}"/>
+                <a16:creationId xmlns:a16="http://schemas.microsoft.com/office/drawing/2014/main" id="{BB78F388-2348-4EE9-ACA1-72C12B098B2E}"/>
               </a:ext>
             </a:extLst>
           </p:cNvPr>
@@ -6025,91 +5989,8 @@
         </p:nvSpPr>
         <p:spPr>
           <a:xfrm>
-            <a:off x="599442" y="5085184"/>
-            <a:ext cx="8075240" cy="1708160"/>
-          </a:xfrm>
-          <a:prstGeom prst="rect">
-            <a:avLst/>
-          </a:prstGeom>
-          <a:noFill/>
-        </p:spPr>
-        <p:txBody>
-          <a:bodyPr wrap="square">
-            <a:spAutoFit/>
-          </a:bodyPr>
-          <a:lstStyle/>
-          <a:p>
-            <a:pPr>
-              <a:spcBef>
-                <a:spcPts val="600"/>
-              </a:spcBef>
-            </a:pPr>
-            <a:r>
-              <a:rPr lang="en-US" dirty="0"/>
-              <a:t>Wunderlich, T. C., &amp; Pehle, C. (2021). Event-based backpropagation can compute exact gradients for spiking neural networks. </a:t>
-            </a:r>
-            <a:r>
-              <a:rPr lang="en-US" i="1" dirty="0"/>
-              <a:t>Scientific Reports</a:t>
-            </a:r>
-            <a:r>
-              <a:rPr lang="en-US" dirty="0"/>
-              <a:t>, </a:t>
-            </a:r>
-            <a:r>
-              <a:rPr lang="en-US" i="1" dirty="0"/>
-              <a:t>11</a:t>
-            </a:r>
-            <a:r>
-              <a:rPr lang="en-US" dirty="0"/>
-              <a:t>(1), 1-17.</a:t>
-            </a:r>
-          </a:p>
-          <a:p>
-            <a:pPr>
-              <a:spcBef>
-                <a:spcPts val="600"/>
-              </a:spcBef>
-            </a:pPr>
-            <a:r>
-              <a:rPr lang="en-US" dirty="0"/>
-              <a:t>https://lava-nc.org/dl.html</a:t>
-            </a:r>
-          </a:p>
-          <a:p>
-            <a:pPr>
-              <a:spcBef>
-                <a:spcPts val="600"/>
-              </a:spcBef>
-            </a:pPr>
-            <a:endParaRPr lang="ru-RU" dirty="0"/>
-          </a:p>
-          <a:p>
-            <a:pPr>
-              <a:spcBef>
-                <a:spcPts val="600"/>
-              </a:spcBef>
-            </a:pPr>
-            <a:endParaRPr lang="ru-RU" dirty="0"/>
-          </a:p>
-        </p:txBody>
-      </p:sp>
-      <p:sp>
-        <p:nvSpPr>
-          <p:cNvPr id="6" name="TextBox 5">
-            <a:extLst>
-              <a:ext uri="{FF2B5EF4-FFF2-40B4-BE49-F238E27FC236}">
-                <a16:creationId xmlns:a16="http://schemas.microsoft.com/office/drawing/2014/main" id="{B135297D-F23D-3D7E-99F6-3B1CB231ED7D}"/>
-              </a:ext>
-            </a:extLst>
-          </p:cNvPr>
-          <p:cNvSpPr txBox="1"/>
-          <p:nvPr/>
-        </p:nvSpPr>
-        <p:spPr>
-          <a:xfrm>
-            <a:off x="712626" y="1034152"/>
-            <a:ext cx="7848872" cy="1477328"/>
+            <a:off x="971600" y="908720"/>
+            <a:ext cx="7848872" cy="2169825"/>
           </a:xfrm>
           <a:prstGeom prst="rect">
             <a:avLst/>
@@ -6130,15 +6011,23 @@
             </a:pPr>
             <a:r>
               <a:rPr lang="ru-RU" sz="2000" dirty="0"/>
-              <a:t>Выбрать </a:t>
+              <a:t>Создать набор простых образов, закодированных бинарными признаками. Например, </a:t>
+            </a:r>
+            <a:r>
+              <a:rPr lang="en-US" sz="2000" dirty="0"/>
+              <a:t>0-1 </a:t>
+            </a:r>
+            <a:r>
+              <a:rPr lang="ru-RU" sz="2000" dirty="0"/>
+              <a:t>матриц (крестик, квадрат </a:t>
             </a:r>
             <a:r>
               <a:rPr lang="ru-RU" sz="2000" dirty="0" err="1"/>
-              <a:t>датасет</a:t>
+              <a:t>итд</a:t>
             </a:r>
             <a:r>
               <a:rPr lang="ru-RU" sz="2000" dirty="0"/>
-              <a:t> (картинки, временные ряды и т.д.)</a:t>
+              <a:t>)</a:t>
             </a:r>
           </a:p>
           <a:p>
@@ -6150,7 +6039,7 @@
             </a:pPr>
             <a:r>
               <a:rPr lang="ru-RU" sz="2000" dirty="0"/>
-              <a:t>Сформулировать задачу: классификация, предсказание, обнаружение аномалий</a:t>
+              <a:t>Используя одно из правил обучения, научить сеть осцилляторов распознавать образы</a:t>
             </a:r>
           </a:p>
           <a:p>
@@ -6162,53 +6051,147 @@
             </a:pPr>
             <a:r>
               <a:rPr lang="ru-RU" sz="2000" dirty="0"/>
-              <a:t>Обучить </a:t>
+              <a:t>Создать сеть большего размера и повторить процедуру обучения</a:t>
+            </a:r>
+          </a:p>
+          <a:p>
+            <a:pPr marL="457200" indent="-457200">
+              <a:spcBef>
+                <a:spcPts val="600"/>
+              </a:spcBef>
+              <a:buAutoNum type="arabicPeriod"/>
+            </a:pPr>
+            <a:r>
+              <a:rPr lang="ru-RU" sz="2000" dirty="0"/>
+              <a:t>Протестировать обучение и работу сети на </a:t>
             </a:r>
             <a:r>
               <a:rPr lang="ru-RU" sz="2000" dirty="0" err="1"/>
-              <a:t>спайковую</a:t>
+              <a:t>датасете</a:t>
             </a:r>
             <a:r>
               <a:rPr lang="ru-RU" sz="2000" dirty="0"/>
-              <a:t> нейросеть градиентными методами</a:t>
-            </a:r>
-          </a:p>
-        </p:txBody>
-      </p:sp>
-      <p:pic>
-        <p:nvPicPr>
-          <p:cNvPr id="7" name="Рисунок 6">
+              <a:t> </a:t>
+            </a:r>
+            <a:r>
+              <a:rPr lang="en-US" sz="2000" dirty="0"/>
+              <a:t>MNIST</a:t>
+            </a:r>
+            <a:endParaRPr lang="ru-RU" sz="2000" dirty="0"/>
+          </a:p>
+        </p:txBody>
+      </p:sp>
+      <p:sp>
+        <p:nvSpPr>
+          <p:cNvPr id="10" name="TextBox 9">
             <a:extLst>
               <a:ext uri="{FF2B5EF4-FFF2-40B4-BE49-F238E27FC236}">
-                <a16:creationId xmlns:a16="http://schemas.microsoft.com/office/drawing/2014/main" id="{30FC57C6-EE71-5FA3-5FD1-9086254E8BFE}"/>
+                <a16:creationId xmlns:a16="http://schemas.microsoft.com/office/drawing/2014/main" id="{227A28F2-17AA-45E1-83C4-72A65ABF37A5}"/>
               </a:ext>
             </a:extLst>
           </p:cNvPr>
-          <p:cNvPicPr>
-            <a:picLocks noChangeAspect="1"/>
-          </p:cNvPicPr>
+          <p:cNvSpPr txBox="1"/>
           <p:nvPr/>
-        </p:nvPicPr>
-        <p:blipFill>
-          <a:blip r:embed="rId2"/>
-          <a:stretch>
-            <a:fillRect/>
-          </a:stretch>
-        </p:blipFill>
-        <p:spPr>
-          <a:xfrm>
-            <a:off x="2051720" y="2653153"/>
-            <a:ext cx="4864101" cy="2244970"/>
+        </p:nvSpPr>
+        <p:spPr>
+          <a:xfrm>
+            <a:off x="1038436" y="4395008"/>
+            <a:ext cx="7715200" cy="1554272"/>
           </a:xfrm>
           <a:prstGeom prst="rect">
             <a:avLst/>
           </a:prstGeom>
-        </p:spPr>
-      </p:pic>
+          <a:noFill/>
+        </p:spPr>
+        <p:txBody>
+          <a:bodyPr wrap="square">
+            <a:spAutoFit/>
+          </a:bodyPr>
+          <a:lstStyle/>
+          <a:p>
+            <a:pPr>
+              <a:spcBef>
+                <a:spcPts val="600"/>
+              </a:spcBef>
+            </a:pPr>
+            <a:r>
+              <a:rPr lang="en-US" dirty="0" err="1"/>
+              <a:t>Hoppensteadt</a:t>
+            </a:r>
+            <a:r>
+              <a:rPr lang="en-US" dirty="0"/>
+              <a:t>, F. C., &amp; </a:t>
+            </a:r>
+            <a:r>
+              <a:rPr lang="en-US" dirty="0" err="1"/>
+              <a:t>Izhikevich</a:t>
+            </a:r>
+            <a:r>
+              <a:rPr lang="en-US" dirty="0"/>
+              <a:t>, E. M. (2001). Synchronization of MEMS resonators and mechanical neurocomputing. </a:t>
+            </a:r>
+            <a:r>
+              <a:rPr lang="en-US" i="1" dirty="0"/>
+              <a:t>IEEE Transactions on Circuits and Systems I: Fundamental Theory and Applications</a:t>
+            </a:r>
+            <a:r>
+              <a:rPr lang="en-US" dirty="0"/>
+              <a:t>, </a:t>
+            </a:r>
+            <a:r>
+              <a:rPr lang="en-US" i="1" dirty="0"/>
+              <a:t>48</a:t>
+            </a:r>
+            <a:r>
+              <a:rPr lang="en-US" dirty="0"/>
+              <a:t>(2), 133-138.</a:t>
+            </a:r>
+          </a:p>
+          <a:p>
+            <a:pPr>
+              <a:spcBef>
+                <a:spcPts val="600"/>
+              </a:spcBef>
+            </a:pPr>
+            <a:r>
+              <a:rPr lang="en-US" dirty="0" err="1"/>
+              <a:t>Hoppensteadt</a:t>
+            </a:r>
+            <a:r>
+              <a:rPr lang="en-US" dirty="0"/>
+              <a:t>, F. C., &amp; </a:t>
+            </a:r>
+            <a:r>
+              <a:rPr lang="en-US" dirty="0" err="1"/>
+              <a:t>Izhikevich</a:t>
+            </a:r>
+            <a:r>
+              <a:rPr lang="en-US" dirty="0"/>
+              <a:t>, E. M. (1999). Oscillatory neurocomputers with dynamic connectivity. </a:t>
+            </a:r>
+            <a:r>
+              <a:rPr lang="en-US" i="1" dirty="0"/>
+              <a:t>Physical Review Letters</a:t>
+            </a:r>
+            <a:r>
+              <a:rPr lang="en-US" dirty="0"/>
+              <a:t>, </a:t>
+            </a:r>
+            <a:r>
+              <a:rPr lang="en-US" i="1" dirty="0"/>
+              <a:t>82</a:t>
+            </a:r>
+            <a:r>
+              <a:rPr lang="en-US" dirty="0"/>
+              <a:t>(14), 2983.</a:t>
+            </a:r>
+          </a:p>
+        </p:txBody>
+      </p:sp>
     </p:spTree>
     <p:extLst>
       <p:ext uri="{BB962C8B-B14F-4D97-AF65-F5344CB8AC3E}">
-        <p14:creationId xmlns:p14="http://schemas.microsoft.com/office/powerpoint/2010/main" val="3083571320"/>
+        <p14:creationId xmlns:p14="http://schemas.microsoft.com/office/powerpoint/2010/main" val="2517036279"/>
       </p:ext>
     </p:extLst>
   </p:cSld>
@@ -6974,37 +6957,8 @@
                   <a:schemeClr val="bg1"/>
                 </a:solidFill>
               </a:rPr>
-              <a:t>9. Сравнение </a:t>
-            </a:r>
-            <a:r>
-              <a:rPr lang="en-US" sz="3000" b="1" dirty="0">
-                <a:solidFill>
-                  <a:schemeClr val="bg1"/>
-                </a:solidFill>
-              </a:rPr>
-              <a:t>ANN </a:t>
-            </a:r>
-            <a:r>
-              <a:rPr lang="ru-RU" sz="3000" b="1" dirty="0">
-                <a:solidFill>
-                  <a:schemeClr val="bg1"/>
-                </a:solidFill>
-              </a:rPr>
-              <a:t>и </a:t>
-            </a:r>
-            <a:r>
-              <a:rPr lang="en-US" sz="3000" b="1" dirty="0">
-                <a:solidFill>
-                  <a:schemeClr val="bg1"/>
-                </a:solidFill>
-              </a:rPr>
-              <a:t>SNN</a:t>
-            </a:r>
-            <a:endParaRPr lang="ru-RU" sz="3000" b="1" dirty="0">
-              <a:solidFill>
-                <a:schemeClr val="bg1"/>
-              </a:solidFill>
-            </a:endParaRPr>
+              <a:t>9. Обучение с учителем</a:t>
+            </a:r>
           </a:p>
         </p:txBody>
       </p:sp>
@@ -7035,6 +6989,89 @@
               <a:t>20</a:t>
             </a:fld>
             <a:endParaRPr lang="ru-RU"/>
+          </a:p>
+        </p:txBody>
+      </p:sp>
+      <p:sp>
+        <p:nvSpPr>
+          <p:cNvPr id="12" name="TextBox 11">
+            <a:extLst>
+              <a:ext uri="{FF2B5EF4-FFF2-40B4-BE49-F238E27FC236}">
+                <a16:creationId xmlns:a16="http://schemas.microsoft.com/office/drawing/2014/main" id="{0F9326FC-C20F-4EF4-AA05-08807FE86F6D}"/>
+              </a:ext>
+            </a:extLst>
+          </p:cNvPr>
+          <p:cNvSpPr txBox="1"/>
+          <p:nvPr/>
+        </p:nvSpPr>
+        <p:spPr>
+          <a:xfrm>
+            <a:off x="599442" y="5085184"/>
+            <a:ext cx="8075240" cy="1708160"/>
+          </a:xfrm>
+          <a:prstGeom prst="rect">
+            <a:avLst/>
+          </a:prstGeom>
+          <a:noFill/>
+        </p:spPr>
+        <p:txBody>
+          <a:bodyPr wrap="square">
+            <a:spAutoFit/>
+          </a:bodyPr>
+          <a:lstStyle/>
+          <a:p>
+            <a:pPr>
+              <a:spcBef>
+                <a:spcPts val="600"/>
+              </a:spcBef>
+            </a:pPr>
+            <a:r>
+              <a:rPr lang="en-US" dirty="0"/>
+              <a:t>Wunderlich, T. C., &amp; Pehle, C. (2021). Event-based backpropagation can compute exact gradients for spiking neural networks. </a:t>
+            </a:r>
+            <a:r>
+              <a:rPr lang="en-US" i="1" dirty="0"/>
+              <a:t>Scientific Reports</a:t>
+            </a:r>
+            <a:r>
+              <a:rPr lang="en-US" dirty="0"/>
+              <a:t>, </a:t>
+            </a:r>
+            <a:r>
+              <a:rPr lang="en-US" i="1" dirty="0"/>
+              <a:t>11</a:t>
+            </a:r>
+            <a:r>
+              <a:rPr lang="en-US" dirty="0"/>
+              <a:t>(1), 1-17.</a:t>
+            </a:r>
+          </a:p>
+          <a:p>
+            <a:pPr>
+              <a:spcBef>
+                <a:spcPts val="600"/>
+              </a:spcBef>
+            </a:pPr>
+            <a:r>
+              <a:rPr lang="en-US" dirty="0"/>
+              <a:t>https://lava-nc.org/dl.html</a:t>
+            </a:r>
+          </a:p>
+          <a:p>
+            <a:pPr>
+              <a:spcBef>
+                <a:spcPts val="600"/>
+              </a:spcBef>
+            </a:pPr>
+            <a:endParaRPr lang="ru-RU" dirty="0"/>
+          </a:p>
+          <a:p>
+            <a:pPr>
+              <a:spcBef>
+                <a:spcPts val="600"/>
+              </a:spcBef>
+            </a:pPr>
+            <a:endParaRPr lang="ru-RU" dirty="0"/>
           </a:p>
         </p:txBody>
       </p:sp>
@@ -7053,7 +7090,7 @@
         <p:spPr>
           <a:xfrm>
             <a:off x="712626" y="1034152"/>
-            <a:ext cx="7848872" cy="1169551"/>
+            <a:ext cx="7848872" cy="1477328"/>
           </a:xfrm>
           <a:prstGeom prst="rect">
             <a:avLst/>
@@ -7074,15 +7111,15 @@
             </a:pPr>
             <a:r>
               <a:rPr lang="ru-RU" sz="2000" dirty="0"/>
-              <a:t>Выбрать какую-нибудь задачу </a:t>
-            </a:r>
-            <a:r>
-              <a:rPr lang="en-US" sz="2000" dirty="0"/>
-              <a:t>ML </a:t>
+              <a:t>Выбрать </a:t>
+            </a:r>
+            <a:r>
+              <a:rPr lang="ru-RU" sz="2000" dirty="0" err="1"/>
+              <a:t>датасет</a:t>
             </a:r>
             <a:r>
               <a:rPr lang="ru-RU" sz="2000" dirty="0"/>
-              <a:t>из перечисленных выше</a:t>
+              <a:t> (картинки, временные ряды и т.д.)</a:t>
             </a:r>
           </a:p>
           <a:p>
@@ -7094,15 +7131,7 @@
             </a:pPr>
             <a:r>
               <a:rPr lang="ru-RU" sz="2000" dirty="0"/>
-              <a:t>Обучить </a:t>
-            </a:r>
-            <a:r>
-              <a:rPr lang="en-US" sz="2000" dirty="0"/>
-              <a:t>ANN </a:t>
-            </a:r>
-            <a:r>
-              <a:rPr lang="ru-RU" sz="2000" dirty="0"/>
-              <a:t>ее решать</a:t>
+              <a:t>Сформулировать задачу: классификация, предсказание, обнаружение аномалий</a:t>
             </a:r>
           </a:p>
           <a:p>
@@ -7114,7 +7143,233 @@
             </a:pPr>
             <a:r>
               <a:rPr lang="ru-RU" sz="2000" dirty="0"/>
-              <a:t>Конвертировать </a:t>
+              <a:t>Обучить </a:t>
+            </a:r>
+            <a:r>
+              <a:rPr lang="ru-RU" sz="2000" dirty="0" err="1"/>
+              <a:t>спайковую</a:t>
+            </a:r>
+            <a:r>
+              <a:rPr lang="ru-RU" sz="2000" dirty="0"/>
+              <a:t> нейросеть градиентными методами</a:t>
+            </a:r>
+          </a:p>
+        </p:txBody>
+      </p:sp>
+      <p:pic>
+        <p:nvPicPr>
+          <p:cNvPr id="7" name="Рисунок 6">
+            <a:extLst>
+              <a:ext uri="{FF2B5EF4-FFF2-40B4-BE49-F238E27FC236}">
+                <a16:creationId xmlns:a16="http://schemas.microsoft.com/office/drawing/2014/main" id="{30FC57C6-EE71-5FA3-5FD1-9086254E8BFE}"/>
+              </a:ext>
+            </a:extLst>
+          </p:cNvPr>
+          <p:cNvPicPr>
+            <a:picLocks noChangeAspect="1"/>
+          </p:cNvPicPr>
+          <p:nvPr/>
+        </p:nvPicPr>
+        <p:blipFill>
+          <a:blip r:embed="rId2"/>
+          <a:stretch>
+            <a:fillRect/>
+          </a:stretch>
+        </p:blipFill>
+        <p:spPr>
+          <a:xfrm>
+            <a:off x="2051720" y="2653153"/>
+            <a:ext cx="4864101" cy="2244970"/>
+          </a:xfrm>
+          <a:prstGeom prst="rect">
+            <a:avLst/>
+          </a:prstGeom>
+        </p:spPr>
+      </p:pic>
+    </p:spTree>
+    <p:extLst>
+      <p:ext uri="{BB962C8B-B14F-4D97-AF65-F5344CB8AC3E}">
+        <p14:creationId xmlns:p14="http://schemas.microsoft.com/office/powerpoint/2010/main" val="3083571320"/>
+      </p:ext>
+    </p:extLst>
+  </p:cSld>
+  <p:clrMapOvr>
+    <a:masterClrMapping/>
+  </p:clrMapOvr>
+</p:sld>
+</file>
+
+<file path=ppt/slides/slide21.xml><?xml version="1.0" encoding="utf-8"?>
+<p:sld xmlns:a="http://schemas.openxmlformats.org/drawingml/2006/main" xmlns:r="http://schemas.openxmlformats.org/officeDocument/2006/relationships" xmlns:p="http://schemas.openxmlformats.org/presentationml/2006/main">
+  <p:cSld>
+    <p:spTree>
+      <p:nvGrpSpPr>
+        <p:cNvPr id="1" name=""/>
+        <p:cNvGrpSpPr/>
+        <p:nvPr/>
+      </p:nvGrpSpPr>
+      <p:grpSpPr>
+        <a:xfrm>
+          <a:off x="0" y="0"/>
+          <a:ext cx="0" cy="0"/>
+          <a:chOff x="0" y="0"/>
+          <a:chExt cx="0" cy="0"/>
+        </a:xfrm>
+      </p:grpSpPr>
+      <p:sp>
+        <p:nvSpPr>
+          <p:cNvPr id="2" name="Заголовок 1"/>
+          <p:cNvSpPr>
+            <a:spLocks noGrp="1"/>
+          </p:cNvSpPr>
+          <p:nvPr>
+            <p:ph type="title"/>
+          </p:nvPr>
+        </p:nvSpPr>
+        <p:spPr>
+          <a:xfrm>
+            <a:off x="0" y="0"/>
+            <a:ext cx="9144000" cy="720000"/>
+          </a:xfrm>
+          <a:solidFill>
+            <a:schemeClr val="accent6">
+              <a:lumMod val="75000"/>
+            </a:schemeClr>
+          </a:solidFill>
+        </p:spPr>
+        <p:txBody>
+          <a:bodyPr vert="horz" lIns="91440" tIns="45720" rIns="91440" bIns="45720" rtlCol="0" anchor="ctr">
+            <a:normAutofit/>
+          </a:bodyPr>
+          <a:lstStyle/>
+          <a:p>
+            <a:r>
+              <a:rPr lang="ru-RU" sz="3000" b="1" dirty="0">
+                <a:solidFill>
+                  <a:schemeClr val="bg1"/>
+                </a:solidFill>
+              </a:rPr>
+              <a:t>10. Сравнение </a:t>
+            </a:r>
+            <a:r>
+              <a:rPr lang="en-US" sz="3000" b="1" dirty="0">
+                <a:solidFill>
+                  <a:schemeClr val="bg1"/>
+                </a:solidFill>
+              </a:rPr>
+              <a:t>ANN </a:t>
+            </a:r>
+            <a:r>
+              <a:rPr lang="ru-RU" sz="3000" b="1" dirty="0">
+                <a:solidFill>
+                  <a:schemeClr val="bg1"/>
+                </a:solidFill>
+              </a:rPr>
+              <a:t>и </a:t>
+            </a:r>
+            <a:r>
+              <a:rPr lang="en-US" sz="3000" b="1" dirty="0">
+                <a:solidFill>
+                  <a:schemeClr val="bg1"/>
+                </a:solidFill>
+              </a:rPr>
+              <a:t>SNN</a:t>
+            </a:r>
+            <a:endParaRPr lang="ru-RU" sz="3000" b="1" dirty="0">
+              <a:solidFill>
+                <a:schemeClr val="bg1"/>
+              </a:solidFill>
+            </a:endParaRPr>
+          </a:p>
+        </p:txBody>
+      </p:sp>
+      <p:sp>
+        <p:nvSpPr>
+          <p:cNvPr id="3" name="Номер слайда 2">
+            <a:extLst>
+              <a:ext uri="{FF2B5EF4-FFF2-40B4-BE49-F238E27FC236}">
+                <a16:creationId xmlns:a16="http://schemas.microsoft.com/office/drawing/2014/main" id="{17D43398-658E-4A8E-94ED-56C85246F70F}"/>
+              </a:ext>
+            </a:extLst>
+          </p:cNvPr>
+          <p:cNvSpPr>
+            <a:spLocks noGrp="1"/>
+          </p:cNvSpPr>
+          <p:nvPr>
+            <p:ph type="sldNum" sz="quarter" idx="12"/>
+          </p:nvPr>
+        </p:nvSpPr>
+        <p:spPr/>
+        <p:txBody>
+          <a:bodyPr/>
+          <a:lstStyle/>
+          <a:p>
+            <a:fld id="{514A22A7-BA4B-4249-B554-560B7C84D175}" type="slidenum">
+              <a:rPr lang="ru-RU" smtClean="0"/>
+              <a:pPr/>
+              <a:t>21</a:t>
+            </a:fld>
+            <a:endParaRPr lang="ru-RU"/>
+          </a:p>
+        </p:txBody>
+      </p:sp>
+      <p:sp>
+        <p:nvSpPr>
+          <p:cNvPr id="6" name="TextBox 5">
+            <a:extLst>
+              <a:ext uri="{FF2B5EF4-FFF2-40B4-BE49-F238E27FC236}">
+                <a16:creationId xmlns:a16="http://schemas.microsoft.com/office/drawing/2014/main" id="{B135297D-F23D-3D7E-99F6-3B1CB231ED7D}"/>
+              </a:ext>
+            </a:extLst>
+          </p:cNvPr>
+          <p:cNvSpPr txBox="1"/>
+          <p:nvPr/>
+        </p:nvSpPr>
+        <p:spPr>
+          <a:xfrm>
+            <a:off x="712626" y="1034152"/>
+            <a:ext cx="7848872" cy="1169551"/>
+          </a:xfrm>
+          <a:prstGeom prst="rect">
+            <a:avLst/>
+          </a:prstGeom>
+          <a:noFill/>
+        </p:spPr>
+        <p:txBody>
+          <a:bodyPr wrap="square">
+            <a:spAutoFit/>
+          </a:bodyPr>
+          <a:lstStyle/>
+          <a:p>
+            <a:pPr marL="457200" indent="-457200">
+              <a:spcBef>
+                <a:spcPts val="600"/>
+              </a:spcBef>
+              <a:buAutoNum type="arabicPeriod"/>
+            </a:pPr>
+            <a:r>
+              <a:rPr lang="ru-RU" sz="2000" dirty="0"/>
+              <a:t>Выбрать какую-нибудь задачу </a:t>
+            </a:r>
+            <a:r>
+              <a:rPr lang="en-US" sz="2000" dirty="0"/>
+              <a:t>ML </a:t>
+            </a:r>
+            <a:r>
+              <a:rPr lang="ru-RU" sz="2000" dirty="0"/>
+              <a:t>из перечисленных выше</a:t>
+            </a:r>
+          </a:p>
+          <a:p>
+            <a:pPr marL="457200" indent="-457200">
+              <a:spcBef>
+                <a:spcPts val="600"/>
+              </a:spcBef>
+              <a:buAutoNum type="arabicPeriod"/>
+            </a:pPr>
+            <a:r>
+              <a:rPr lang="ru-RU" sz="2000" dirty="0"/>
+              <a:t>Обучить </a:t>
             </a:r>
             <a:r>
               <a:rPr lang="en-US" sz="2000" dirty="0"/>
@@ -7122,6 +7377,26 @@
             </a:r>
             <a:r>
               <a:rPr lang="ru-RU" sz="2000" dirty="0"/>
+              <a:t>ее решать</a:t>
+            </a:r>
+          </a:p>
+          <a:p>
+            <a:pPr marL="457200" indent="-457200">
+              <a:spcBef>
+                <a:spcPts val="600"/>
+              </a:spcBef>
+              <a:buAutoNum type="arabicPeriod"/>
+            </a:pPr>
+            <a:r>
+              <a:rPr lang="ru-RU" sz="2000" dirty="0"/>
+              <a:t>Конвертировать </a:t>
+            </a:r>
+            <a:r>
+              <a:rPr lang="en-US" sz="2000" dirty="0"/>
+              <a:t>ANN </a:t>
+            </a:r>
+            <a:r>
+              <a:rPr lang="ru-RU" sz="2000" dirty="0"/>
               <a:t>в </a:t>
             </a:r>
             <a:r>
@@ -7132,6 +7407,50 @@
               <a:rPr lang="ru-RU" sz="2000" dirty="0"/>
               <a:t>сравнить качество</a:t>
             </a:r>
+          </a:p>
+        </p:txBody>
+      </p:sp>
+      <p:sp>
+        <p:nvSpPr>
+          <p:cNvPr id="7" name="TextBox 6">
+            <a:extLst>
+              <a:ext uri="{FF2B5EF4-FFF2-40B4-BE49-F238E27FC236}">
+                <a16:creationId xmlns:a16="http://schemas.microsoft.com/office/drawing/2014/main" id="{DF909F82-825E-E06D-4EE2-472841903441}"/>
+              </a:ext>
+            </a:extLst>
+          </p:cNvPr>
+          <p:cNvSpPr txBox="1"/>
+          <p:nvPr/>
+        </p:nvSpPr>
+        <p:spPr>
+          <a:xfrm>
+            <a:off x="1115616" y="4797152"/>
+            <a:ext cx="7571184" cy="923330"/>
+          </a:xfrm>
+          <a:prstGeom prst="rect">
+            <a:avLst/>
+          </a:prstGeom>
+          <a:noFill/>
+        </p:spPr>
+        <p:txBody>
+          <a:bodyPr wrap="square">
+            <a:spAutoFit/>
+          </a:bodyPr>
+          <a:lstStyle/>
+          <a:p>
+            <a:r>
+              <a:rPr lang="en-US" dirty="0"/>
+              <a:t>Diehl, P. U. et.al. (2016) Conversion of artificial recurrent neural networks to spiking neural networks for low-power neuromorphic hardware. In </a:t>
+            </a:r>
+            <a:r>
+              <a:rPr lang="en-US" i="1" dirty="0"/>
+              <a:t>2016 IEEE International Conference on Rebooting Computing (ICRC)</a:t>
+            </a:r>
+            <a:r>
+              <a:rPr lang="en-US" dirty="0"/>
+              <a:t> (pp. 1-8). IEEE</a:t>
+            </a:r>
+            <a:endParaRPr lang="ru-RU" dirty="0"/>
           </a:p>
         </p:txBody>
       </p:sp>

</xml_diff>